<commit_message>
Unsaved changes to report
</commit_message>
<xml_diff>
--- a/DataCase.pptx
+++ b/DataCase.pptx
@@ -3903,7 +3903,7 @@
                 </a:solidFill>
                 <a:latin typeface="HK Grotesk Medium Bold"/>
               </a:rPr>
-              <a:t>The Results (</a:t>
+              <a:t>Data Visualization (</a:t>
             </a:r>
             <a:r>
               <a:rPr lang="en-US" sz="3000" i="1" spc="-30" dirty="0">
@@ -4045,9 +4045,9 @@
         <p:grpSpPr>
           <a:xfrm>
             <a:off x="1030074" y="6465716"/>
-            <a:ext cx="4095787" cy="2278573"/>
+            <a:ext cx="4095787" cy="2278574"/>
             <a:chOff x="0" y="-9525"/>
-            <a:chExt cx="5461049" cy="3038097"/>
+            <a:chExt cx="5461049" cy="3038098"/>
           </a:xfrm>
         </p:grpSpPr>
         <p:sp>
@@ -4083,7 +4083,7 @@
                   </a:solidFill>
                   <a:latin typeface="HK Grotesk Medium Bold"/>
                 </a:rPr>
-                <a:t>Disney acquired large entertainment studios under Robert </a:t>
+                <a:t>Disney acquisition of entertainment studios under Robert </a:t>
               </a:r>
               <a:r>
                 <a:rPr lang="en-US" sz="3000" spc="-30" dirty="0" err="1">
@@ -4111,7 +4111,7 @@
           </p:nvSpPr>
           <p:spPr>
             <a:xfrm>
-              <a:off x="0" y="1988201"/>
+              <a:off x="0" y="1988202"/>
               <a:ext cx="5461049" cy="1040371"/>
             </a:xfrm>
             <a:prstGeom prst="rect">
@@ -6306,7 +6306,7 @@
                 </a:solidFill>
                 <a:latin typeface="HK Grotesk Medium Bold"/>
               </a:rPr>
-              <a:t>The </a:t>
+              <a:t>Data </a:t>
             </a:r>
             <a:r>
               <a:rPr lang="en-US" sz="7200" dirty="0">
@@ -6315,7 +6315,7 @@
                 </a:solidFill>
                 <a:latin typeface="HK Grotesk Medium Bold"/>
               </a:rPr>
-              <a:t>Results</a:t>
+              <a:t>Visualization</a:t>
             </a:r>
           </a:p>
         </p:txBody>

</xml_diff>